<commit_message>
[LEI] version 1.0 do bot de provérbios
</commit_message>
<xml_diff>
--- a/LEI/imagens_relatorio/lei_imagens.pptx
+++ b/LEI/imagens_relatorio/lei_imagens.pptx
@@ -6,6 +6,7 @@
   </p:sldMasterIdLst>
   <p:sldIdLst>
     <p:sldId id="256" r:id="rId2"/>
+    <p:sldId id="257" r:id="rId3"/>
   </p:sldIdLst>
   <p:sldSz cx="12192000" cy="6858000"/>
   <p:notesSz cx="6858000" cy="9144000"/>
@@ -104,6 +105,11 @@
       </a:defRPr>
     </a:lvl9pPr>
   </p:defaultTextStyle>
+  <p:extLst>
+    <p:ext uri="{EFAFB233-063F-42B5-8137-9DF3F51BA10A}">
+      <p15:sldGuideLst xmlns:p15="http://schemas.microsoft.com/office/powerpoint/2012/main"/>
+    </p:ext>
+  </p:extLst>
 </p:presentation>
 </file>
 
@@ -254,7 +260,7 @@
           <a:p>
             <a:fld id="{30FBCEFD-7609-49CC-BAEB-2982FABF0180}" type="datetimeFigureOut">
               <a:rPr lang="pt-PT" smtClean="0"/>
-              <a:t>22/02/2019</a:t>
+              <a:t>25/02/2019</a:t>
             </a:fld>
             <a:endParaRPr lang="pt-PT"/>
           </a:p>
@@ -452,7 +458,7 @@
           <a:p>
             <a:fld id="{30FBCEFD-7609-49CC-BAEB-2982FABF0180}" type="datetimeFigureOut">
               <a:rPr lang="pt-PT" smtClean="0"/>
-              <a:t>22/02/2019</a:t>
+              <a:t>25/02/2019</a:t>
             </a:fld>
             <a:endParaRPr lang="pt-PT"/>
           </a:p>
@@ -660,7 +666,7 @@
           <a:p>
             <a:fld id="{30FBCEFD-7609-49CC-BAEB-2982FABF0180}" type="datetimeFigureOut">
               <a:rPr lang="pt-PT" smtClean="0"/>
-              <a:t>22/02/2019</a:t>
+              <a:t>25/02/2019</a:t>
             </a:fld>
             <a:endParaRPr lang="pt-PT"/>
           </a:p>
@@ -858,7 +864,7 @@
           <a:p>
             <a:fld id="{30FBCEFD-7609-49CC-BAEB-2982FABF0180}" type="datetimeFigureOut">
               <a:rPr lang="pt-PT" smtClean="0"/>
-              <a:t>22/02/2019</a:t>
+              <a:t>25/02/2019</a:t>
             </a:fld>
             <a:endParaRPr lang="pt-PT"/>
           </a:p>
@@ -1133,7 +1139,7 @@
           <a:p>
             <a:fld id="{30FBCEFD-7609-49CC-BAEB-2982FABF0180}" type="datetimeFigureOut">
               <a:rPr lang="pt-PT" smtClean="0"/>
-              <a:t>22/02/2019</a:t>
+              <a:t>25/02/2019</a:t>
             </a:fld>
             <a:endParaRPr lang="pt-PT"/>
           </a:p>
@@ -1398,7 +1404,7 @@
           <a:p>
             <a:fld id="{30FBCEFD-7609-49CC-BAEB-2982FABF0180}" type="datetimeFigureOut">
               <a:rPr lang="pt-PT" smtClean="0"/>
-              <a:t>22/02/2019</a:t>
+              <a:t>25/02/2019</a:t>
             </a:fld>
             <a:endParaRPr lang="pt-PT"/>
           </a:p>
@@ -1810,7 +1816,7 @@
           <a:p>
             <a:fld id="{30FBCEFD-7609-49CC-BAEB-2982FABF0180}" type="datetimeFigureOut">
               <a:rPr lang="pt-PT" smtClean="0"/>
-              <a:t>22/02/2019</a:t>
+              <a:t>25/02/2019</a:t>
             </a:fld>
             <a:endParaRPr lang="pt-PT"/>
           </a:p>
@@ -1951,7 +1957,7 @@
           <a:p>
             <a:fld id="{30FBCEFD-7609-49CC-BAEB-2982FABF0180}" type="datetimeFigureOut">
               <a:rPr lang="pt-PT" smtClean="0"/>
-              <a:t>22/02/2019</a:t>
+              <a:t>25/02/2019</a:t>
             </a:fld>
             <a:endParaRPr lang="pt-PT"/>
           </a:p>
@@ -2064,7 +2070,7 @@
           <a:p>
             <a:fld id="{30FBCEFD-7609-49CC-BAEB-2982FABF0180}" type="datetimeFigureOut">
               <a:rPr lang="pt-PT" smtClean="0"/>
-              <a:t>22/02/2019</a:t>
+              <a:t>25/02/2019</a:t>
             </a:fld>
             <a:endParaRPr lang="pt-PT"/>
           </a:p>
@@ -2375,7 +2381,7 @@
           <a:p>
             <a:fld id="{30FBCEFD-7609-49CC-BAEB-2982FABF0180}" type="datetimeFigureOut">
               <a:rPr lang="pt-PT" smtClean="0"/>
-              <a:t>22/02/2019</a:t>
+              <a:t>25/02/2019</a:t>
             </a:fld>
             <a:endParaRPr lang="pt-PT"/>
           </a:p>
@@ -2663,7 +2669,7 @@
           <a:p>
             <a:fld id="{30FBCEFD-7609-49CC-BAEB-2982FABF0180}" type="datetimeFigureOut">
               <a:rPr lang="pt-PT" smtClean="0"/>
-              <a:t>22/02/2019</a:t>
+              <a:t>25/02/2019</a:t>
             </a:fld>
             <a:endParaRPr lang="pt-PT"/>
           </a:p>
@@ -2904,7 +2910,7 @@
           <a:p>
             <a:fld id="{30FBCEFD-7609-49CC-BAEB-2982FABF0180}" type="datetimeFigureOut">
               <a:rPr lang="pt-PT" smtClean="0"/>
-              <a:t>22/02/2019</a:t>
+              <a:t>25/02/2019</a:t>
             </a:fld>
             <a:endParaRPr lang="pt-PT"/>
           </a:p>
@@ -4279,6 +4285,1385 @@
 </p:sld>
 </file>
 
+<file path=ppt/slides/slide2.xml><?xml version="1.0" encoding="utf-8"?>
+<p:sld xmlns:a="http://schemas.openxmlformats.org/drawingml/2006/main" xmlns:r="http://schemas.openxmlformats.org/officeDocument/2006/relationships" xmlns:p="http://schemas.openxmlformats.org/presentationml/2006/main">
+  <p:cSld>
+    <p:spTree>
+      <p:nvGrpSpPr>
+        <p:cNvPr id="1" name=""/>
+        <p:cNvGrpSpPr/>
+        <p:nvPr/>
+      </p:nvGrpSpPr>
+      <p:grpSpPr>
+        <a:xfrm>
+          <a:off x="0" y="0"/>
+          <a:ext cx="0" cy="0"/>
+          <a:chOff x="0" y="0"/>
+          <a:chExt cx="0" cy="0"/>
+        </a:xfrm>
+      </p:grpSpPr>
+      <p:grpSp>
+        <p:nvGrpSpPr>
+          <p:cNvPr id="5" name="Agrupar 4">
+            <a:extLst>
+              <a:ext uri="{FF2B5EF4-FFF2-40B4-BE49-F238E27FC236}">
+                <a16:creationId xmlns:a16="http://schemas.microsoft.com/office/drawing/2014/main" id="{19AAE101-610B-4D32-93E3-41C37F1D041B}"/>
+              </a:ext>
+            </a:extLst>
+          </p:cNvPr>
+          <p:cNvGrpSpPr/>
+          <p:nvPr/>
+        </p:nvGrpSpPr>
+        <p:grpSpPr>
+          <a:xfrm>
+            <a:off x="3028186" y="1297841"/>
+            <a:ext cx="5130126" cy="2844668"/>
+            <a:chOff x="5708842" y="2485013"/>
+            <a:chExt cx="1485509" cy="1279896"/>
+          </a:xfrm>
+          <a:solidFill>
+            <a:srgbClr val="DDDDDD"/>
+          </a:solidFill>
+        </p:grpSpPr>
+        <p:sp>
+          <p:nvSpPr>
+            <p:cNvPr id="17" name="Retângulo: Cantos Arredondados 16">
+              <a:extLst>
+                <a:ext uri="{FF2B5EF4-FFF2-40B4-BE49-F238E27FC236}">
+                  <a16:creationId xmlns:a16="http://schemas.microsoft.com/office/drawing/2014/main" id="{C8555B33-7672-4C16-B208-180F17390397}"/>
+                </a:ext>
+              </a:extLst>
+            </p:cNvPr>
+            <p:cNvSpPr/>
+            <p:nvPr/>
+          </p:nvSpPr>
+          <p:spPr>
+            <a:xfrm>
+              <a:off x="5717492" y="2485013"/>
+              <a:ext cx="1476859" cy="1279896"/>
+            </a:xfrm>
+            <a:prstGeom prst="roundRect">
+              <a:avLst/>
+            </a:prstGeom>
+            <a:solidFill>
+              <a:srgbClr val="EAEAEA"/>
+            </a:solidFill>
+            <a:ln>
+              <a:solidFill>
+                <a:schemeClr val="tx1"/>
+              </a:solidFill>
+            </a:ln>
+          </p:spPr>
+          <p:style>
+            <a:lnRef idx="2">
+              <a:schemeClr val="accent1">
+                <a:shade val="50000"/>
+              </a:schemeClr>
+            </a:lnRef>
+            <a:fillRef idx="1">
+              <a:schemeClr val="accent1"/>
+            </a:fillRef>
+            <a:effectRef idx="0">
+              <a:schemeClr val="accent1"/>
+            </a:effectRef>
+            <a:fontRef idx="minor">
+              <a:schemeClr val="lt1"/>
+            </a:fontRef>
+          </p:style>
+          <p:txBody>
+            <a:bodyPr rtlCol="0" anchor="ctr"/>
+            <a:lstStyle/>
+            <a:p>
+              <a:pPr algn="ctr"/>
+              <a:endParaRPr lang="pt-PT" dirty="0">
+                <a:latin typeface="Arial" panose="020B0604020202020204" pitchFamily="34" charset="0"/>
+                <a:cs typeface="Arial" panose="020B0604020202020204" pitchFamily="34" charset="0"/>
+              </a:endParaRPr>
+            </a:p>
+          </p:txBody>
+        </p:sp>
+        <p:sp>
+          <p:nvSpPr>
+            <p:cNvPr id="19" name="CaixaDeTexto 18">
+              <a:extLst>
+                <a:ext uri="{FF2B5EF4-FFF2-40B4-BE49-F238E27FC236}">
+                  <a16:creationId xmlns:a16="http://schemas.microsoft.com/office/drawing/2014/main" id="{B7576AD9-709B-4804-99AC-80601EDD1434}"/>
+                </a:ext>
+              </a:extLst>
+            </p:cNvPr>
+            <p:cNvSpPr txBox="1"/>
+            <p:nvPr/>
+          </p:nvSpPr>
+          <p:spPr>
+            <a:xfrm>
+              <a:off x="5708842" y="2925776"/>
+              <a:ext cx="1476859" cy="369332"/>
+            </a:xfrm>
+            <a:prstGeom prst="rect">
+              <a:avLst/>
+            </a:prstGeom>
+            <a:noFill/>
+          </p:spPr>
+          <p:txBody>
+            <a:bodyPr wrap="square" rtlCol="0">
+              <a:spAutoFit/>
+            </a:bodyPr>
+            <a:lstStyle/>
+            <a:p>
+              <a:pPr marL="285750" indent="-285750">
+                <a:buFont typeface="Arial" panose="020B0604020202020204" pitchFamily="34" charset="0"/>
+                <a:buChar char="•"/>
+              </a:pPr>
+              <a:endParaRPr lang="pt-PT" dirty="0">
+                <a:latin typeface="Arial" panose="020B0604020202020204" pitchFamily="34" charset="0"/>
+                <a:cs typeface="Arial" panose="020B0604020202020204" pitchFamily="34" charset="0"/>
+              </a:endParaRPr>
+            </a:p>
+          </p:txBody>
+        </p:sp>
+      </p:grpSp>
+      <p:grpSp>
+        <p:nvGrpSpPr>
+          <p:cNvPr id="7" name="Agrupar 6">
+            <a:extLst>
+              <a:ext uri="{FF2B5EF4-FFF2-40B4-BE49-F238E27FC236}">
+                <a16:creationId xmlns:a16="http://schemas.microsoft.com/office/drawing/2014/main" id="{05C926ED-6353-40F8-BF7C-1FC16749BCCD}"/>
+              </a:ext>
+            </a:extLst>
+          </p:cNvPr>
+          <p:cNvGrpSpPr/>
+          <p:nvPr/>
+        </p:nvGrpSpPr>
+        <p:grpSpPr>
+          <a:xfrm>
+            <a:off x="474669" y="1884910"/>
+            <a:ext cx="1702198" cy="1615946"/>
+            <a:chOff x="134976" y="2455906"/>
+            <a:chExt cx="1702198" cy="1615946"/>
+          </a:xfrm>
+        </p:grpSpPr>
+        <p:sp>
+          <p:nvSpPr>
+            <p:cNvPr id="12" name="Bolha de Discurso: Retângulo com Cantos Arredondados 11">
+              <a:extLst>
+                <a:ext uri="{FF2B5EF4-FFF2-40B4-BE49-F238E27FC236}">
+                  <a16:creationId xmlns:a16="http://schemas.microsoft.com/office/drawing/2014/main" id="{677D79A1-3C55-412D-B60F-7E77E103C6D1}"/>
+                </a:ext>
+              </a:extLst>
+            </p:cNvPr>
+            <p:cNvSpPr/>
+            <p:nvPr/>
+          </p:nvSpPr>
+          <p:spPr>
+            <a:xfrm>
+              <a:off x="672401" y="2455906"/>
+              <a:ext cx="1164773" cy="669418"/>
+            </a:xfrm>
+            <a:prstGeom prst="wedgeRoundRectCallout">
+              <a:avLst>
+                <a:gd name="adj1" fmla="val -36375"/>
+                <a:gd name="adj2" fmla="val 84286"/>
+                <a:gd name="adj3" fmla="val 16667"/>
+              </a:avLst>
+            </a:prstGeom>
+            <a:solidFill>
+              <a:srgbClr val="EAEAEA"/>
+            </a:solidFill>
+            <a:ln>
+              <a:solidFill>
+                <a:schemeClr val="tx1"/>
+              </a:solidFill>
+            </a:ln>
+          </p:spPr>
+          <p:style>
+            <a:lnRef idx="2">
+              <a:schemeClr val="accent1">
+                <a:shade val="50000"/>
+              </a:schemeClr>
+            </a:lnRef>
+            <a:fillRef idx="1">
+              <a:schemeClr val="accent1"/>
+            </a:fillRef>
+            <a:effectRef idx="0">
+              <a:schemeClr val="accent1"/>
+            </a:effectRef>
+            <a:fontRef idx="minor">
+              <a:schemeClr val="lt1"/>
+            </a:fontRef>
+          </p:style>
+          <p:txBody>
+            <a:bodyPr rtlCol="0" anchor="ctr"/>
+            <a:lstStyle/>
+            <a:p>
+              <a:pPr algn="ctr"/>
+              <a:endParaRPr lang="pt-PT" dirty="0"/>
+            </a:p>
+          </p:txBody>
+        </p:sp>
+        <p:sp>
+          <p:nvSpPr>
+            <p:cNvPr id="13" name="CaixaDeTexto 12">
+              <a:extLst>
+                <a:ext uri="{FF2B5EF4-FFF2-40B4-BE49-F238E27FC236}">
+                  <a16:creationId xmlns:a16="http://schemas.microsoft.com/office/drawing/2014/main" id="{FD001890-48F1-4D03-BF58-93BC41882107}"/>
+                </a:ext>
+              </a:extLst>
+            </p:cNvPr>
+            <p:cNvSpPr txBox="1"/>
+            <p:nvPr/>
+          </p:nvSpPr>
+          <p:spPr>
+            <a:xfrm>
+              <a:off x="672401" y="2641507"/>
+              <a:ext cx="1164773" cy="369332"/>
+            </a:xfrm>
+            <a:prstGeom prst="rect">
+              <a:avLst/>
+            </a:prstGeom>
+            <a:noFill/>
+          </p:spPr>
+          <p:txBody>
+            <a:bodyPr wrap="square" rtlCol="0">
+              <a:spAutoFit/>
+            </a:bodyPr>
+            <a:lstStyle/>
+            <a:p>
+              <a:pPr algn="ctr"/>
+              <a:r>
+                <a:rPr lang="pt-PT" dirty="0">
+                  <a:latin typeface="Arial" panose="020B0604020202020204" pitchFamily="34" charset="0"/>
+                  <a:cs typeface="Arial" panose="020B0604020202020204" pitchFamily="34" charset="0"/>
+                </a:rPr>
+                <a:t>Input</a:t>
+              </a:r>
+            </a:p>
+          </p:txBody>
+        </p:sp>
+        <p:pic>
+          <p:nvPicPr>
+            <p:cNvPr id="14" name="Picture 2" descr="Resultado de imagem para person icon">
+              <a:extLst>
+                <a:ext uri="{FF2B5EF4-FFF2-40B4-BE49-F238E27FC236}">
+                  <a16:creationId xmlns:a16="http://schemas.microsoft.com/office/drawing/2014/main" id="{494F94EC-E92D-40D9-8940-B7BB5D896EDC}"/>
+                </a:ext>
+              </a:extLst>
+            </p:cNvPr>
+            <p:cNvPicPr>
+              <a:picLocks noChangeAspect="1" noChangeArrowheads="1"/>
+            </p:cNvPicPr>
+            <p:nvPr/>
+          </p:nvPicPr>
+          <p:blipFill>
+            <a:blip r:embed="rId2">
+              <a:extLst>
+                <a:ext uri="{BEBA8EAE-BF5A-486C-A8C5-ECC9F3942E4B}">
+                  <a14:imgProps xmlns:a14="http://schemas.microsoft.com/office/drawing/2010/main">
+                    <a14:imgLayer r:embed="rId3">
+                      <a14:imgEffect>
+                        <a14:backgroundRemoval t="2000" b="97333" l="9936" r="89984">
+                          <a14:foregroundMark x1="49866" y1="70750" x2="49866" y2="70750"/>
+                          <a14:foregroundMark x1="50456" y1="15750" x2="45140" y2="40500"/>
+                          <a14:foregroundMark x1="50456" y1="18500" x2="62272" y2="25833"/>
+                          <a14:foregroundMark x1="45730" y1="13000" x2="59318" y2="2000"/>
+                          <a14:foregroundMark x1="58727" y1="16667" x2="56955" y2="16667"/>
+                          <a14:foregroundMark x1="32143" y1="86333" x2="32734" y2="89083"/>
+                          <a14:foregroundMark x1="30371" y1="91833" x2="64044" y2="96417"/>
+                          <a14:foregroundMark x1="53410" y1="93667" x2="65816" y2="94583"/>
+                          <a14:foregroundMark x1="72905" y1="91833" x2="57546" y2="97333"/>
+                          <a14:foregroundMark x1="52820" y1="3833" x2="48684" y2="3833"/>
+                          <a14:foregroundMark x1="26235" y1="29500" x2="26235" y2="29500"/>
+                        </a14:backgroundRemoval>
+                      </a14:imgEffect>
+                    </a14:imgLayer>
+                  </a14:imgProps>
+                </a:ext>
+                <a:ext uri="{28A0092B-C50C-407E-A947-70E740481C1C}">
+                  <a14:useLocalDpi xmlns:a14="http://schemas.microsoft.com/office/drawing/2010/main" val="0"/>
+                </a:ext>
+              </a:extLst>
+            </a:blip>
+            <a:srcRect/>
+            <a:stretch>
+              <a:fillRect/>
+            </a:stretch>
+          </p:blipFill>
+          <p:spPr bwMode="auto">
+            <a:xfrm>
+              <a:off x="134976" y="3379125"/>
+              <a:ext cx="1074849" cy="692727"/>
+            </a:xfrm>
+            <a:prstGeom prst="rect">
+              <a:avLst/>
+            </a:prstGeom>
+            <a:noFill/>
+            <a:extLst>
+              <a:ext uri="{909E8E84-426E-40DD-AFC4-6F175D3DCCD1}">
+                <a14:hiddenFill xmlns:a14="http://schemas.microsoft.com/office/drawing/2010/main">
+                  <a:solidFill>
+                    <a:srgbClr val="FFFFFF"/>
+                  </a:solidFill>
+                </a14:hiddenFill>
+              </a:ext>
+            </a:extLst>
+          </p:spPr>
+        </p:pic>
+      </p:grpSp>
+      <p:sp>
+        <p:nvSpPr>
+          <p:cNvPr id="8" name="Seta: Para Baixo 7">
+            <a:extLst>
+              <a:ext uri="{FF2B5EF4-FFF2-40B4-BE49-F238E27FC236}">
+                <a16:creationId xmlns:a16="http://schemas.microsoft.com/office/drawing/2014/main" id="{8C8B2CC5-14BB-48A7-BE8B-E61DDE69B55A}"/>
+              </a:ext>
+            </a:extLst>
+          </p:cNvPr>
+          <p:cNvSpPr/>
+          <p:nvPr/>
+        </p:nvSpPr>
+        <p:spPr>
+          <a:xfrm rot="16200000">
+            <a:off x="2319466" y="2492128"/>
+            <a:ext cx="387927" cy="692727"/>
+          </a:xfrm>
+          <a:prstGeom prst="downArrow">
+            <a:avLst/>
+          </a:prstGeom>
+          <a:solidFill>
+            <a:srgbClr val="00B0F0"/>
+          </a:solidFill>
+          <a:ln>
+            <a:solidFill>
+              <a:srgbClr val="2F528F"/>
+            </a:solidFill>
+          </a:ln>
+        </p:spPr>
+        <p:style>
+          <a:lnRef idx="2">
+            <a:schemeClr val="accent1">
+              <a:shade val="50000"/>
+            </a:schemeClr>
+          </a:lnRef>
+          <a:fillRef idx="1">
+            <a:schemeClr val="accent1"/>
+          </a:fillRef>
+          <a:effectRef idx="0">
+            <a:schemeClr val="accent1"/>
+          </a:effectRef>
+          <a:fontRef idx="minor">
+            <a:schemeClr val="lt1"/>
+          </a:fontRef>
+        </p:style>
+        <p:txBody>
+          <a:bodyPr rtlCol="0" anchor="ctr"/>
+          <a:lstStyle/>
+          <a:p>
+            <a:pPr algn="ctr"/>
+            <a:endParaRPr lang="pt-PT"/>
+          </a:p>
+        </p:txBody>
+      </p:sp>
+      <p:sp>
+        <p:nvSpPr>
+          <p:cNvPr id="24" name="CaixaDeTexto 23">
+            <a:extLst>
+              <a:ext uri="{FF2B5EF4-FFF2-40B4-BE49-F238E27FC236}">
+                <a16:creationId xmlns:a16="http://schemas.microsoft.com/office/drawing/2014/main" id="{777FD7DC-C085-434E-910C-69436A1990CF}"/>
+              </a:ext>
+            </a:extLst>
+          </p:cNvPr>
+          <p:cNvSpPr txBox="1"/>
+          <p:nvPr/>
+        </p:nvSpPr>
+        <p:spPr>
+          <a:xfrm>
+            <a:off x="3073927" y="1381028"/>
+            <a:ext cx="5070382" cy="400110"/>
+          </a:xfrm>
+          <a:prstGeom prst="rect">
+            <a:avLst/>
+          </a:prstGeom>
+          <a:noFill/>
+        </p:spPr>
+        <p:txBody>
+          <a:bodyPr wrap="square" rtlCol="0">
+            <a:spAutoFit/>
+          </a:bodyPr>
+          <a:lstStyle/>
+          <a:p>
+            <a:pPr algn="ctr"/>
+            <a:r>
+              <a:rPr lang="pt-PT" sz="2000" dirty="0"/>
+              <a:t>Análise</a:t>
+            </a:r>
+          </a:p>
+        </p:txBody>
+      </p:sp>
+      <p:sp>
+        <p:nvSpPr>
+          <p:cNvPr id="25" name="CaixaDeTexto 24">
+            <a:extLst>
+              <a:ext uri="{FF2B5EF4-FFF2-40B4-BE49-F238E27FC236}">
+                <a16:creationId xmlns:a16="http://schemas.microsoft.com/office/drawing/2014/main" id="{84AB3F14-7866-4CA6-9C45-78D2039A2C3C}"/>
+              </a:ext>
+            </a:extLst>
+          </p:cNvPr>
+          <p:cNvSpPr txBox="1"/>
+          <p:nvPr/>
+        </p:nvSpPr>
+        <p:spPr>
+          <a:xfrm>
+            <a:off x="3679145" y="1932619"/>
+            <a:ext cx="1035146" cy="369332"/>
+          </a:xfrm>
+          <a:prstGeom prst="rect">
+            <a:avLst/>
+          </a:prstGeom>
+          <a:noFill/>
+        </p:spPr>
+        <p:txBody>
+          <a:bodyPr wrap="square" rtlCol="0">
+            <a:spAutoFit/>
+          </a:bodyPr>
+          <a:lstStyle/>
+          <a:p>
+            <a:pPr algn="ctr"/>
+            <a:r>
+              <a:rPr lang="pt-PT" dirty="0"/>
+              <a:t>Pergunta</a:t>
+            </a:r>
+          </a:p>
+        </p:txBody>
+      </p:sp>
+      <p:sp>
+        <p:nvSpPr>
+          <p:cNvPr id="26" name="Seta: Para Baixo 25">
+            <a:extLst>
+              <a:ext uri="{FF2B5EF4-FFF2-40B4-BE49-F238E27FC236}">
+                <a16:creationId xmlns:a16="http://schemas.microsoft.com/office/drawing/2014/main" id="{0023CD7E-E3C0-4B3F-AD53-2A27DCC84BCE}"/>
+              </a:ext>
+            </a:extLst>
+          </p:cNvPr>
+          <p:cNvSpPr/>
+          <p:nvPr/>
+        </p:nvSpPr>
+        <p:spPr>
+          <a:xfrm rot="16200000">
+            <a:off x="4762434" y="1977250"/>
+            <a:ext cx="184664" cy="280070"/>
+          </a:xfrm>
+          <a:prstGeom prst="downArrow">
+            <a:avLst/>
+          </a:prstGeom>
+          <a:solidFill>
+            <a:srgbClr val="00B0F0"/>
+          </a:solidFill>
+          <a:ln>
+            <a:solidFill>
+              <a:srgbClr val="2F528F"/>
+            </a:solidFill>
+          </a:ln>
+        </p:spPr>
+        <p:style>
+          <a:lnRef idx="2">
+            <a:schemeClr val="accent1">
+              <a:shade val="50000"/>
+            </a:schemeClr>
+          </a:lnRef>
+          <a:fillRef idx="1">
+            <a:schemeClr val="accent1"/>
+          </a:fillRef>
+          <a:effectRef idx="0">
+            <a:schemeClr val="accent1"/>
+          </a:effectRef>
+          <a:fontRef idx="minor">
+            <a:schemeClr val="lt1"/>
+          </a:fontRef>
+        </p:style>
+        <p:txBody>
+          <a:bodyPr rtlCol="0" anchor="ctr"/>
+          <a:lstStyle/>
+          <a:p>
+            <a:pPr algn="ctr"/>
+            <a:endParaRPr lang="pt-PT"/>
+          </a:p>
+        </p:txBody>
+      </p:sp>
+      <p:sp>
+        <p:nvSpPr>
+          <p:cNvPr id="27" name="CaixaDeTexto 26">
+            <a:extLst>
+              <a:ext uri="{FF2B5EF4-FFF2-40B4-BE49-F238E27FC236}">
+                <a16:creationId xmlns:a16="http://schemas.microsoft.com/office/drawing/2014/main" id="{49BF924F-ACD1-471B-A1C7-73E5381FB822}"/>
+              </a:ext>
+            </a:extLst>
+          </p:cNvPr>
+          <p:cNvSpPr txBox="1"/>
+          <p:nvPr/>
+        </p:nvSpPr>
+        <p:spPr>
+          <a:xfrm>
+            <a:off x="5119623" y="1932619"/>
+            <a:ext cx="1256880" cy="369332"/>
+          </a:xfrm>
+          <a:prstGeom prst="rect">
+            <a:avLst/>
+          </a:prstGeom>
+          <a:noFill/>
+        </p:spPr>
+        <p:txBody>
+          <a:bodyPr wrap="square" rtlCol="0">
+            <a:spAutoFit/>
+          </a:bodyPr>
+          <a:lstStyle/>
+          <a:p>
+            <a:pPr algn="ctr"/>
+            <a:r>
+              <a:rPr lang="pt-PT" dirty="0"/>
+              <a:t>Base Dados</a:t>
+            </a:r>
+          </a:p>
+        </p:txBody>
+      </p:sp>
+      <p:sp>
+        <p:nvSpPr>
+          <p:cNvPr id="28" name="Seta: Para Baixo 27">
+            <a:extLst>
+              <a:ext uri="{FF2B5EF4-FFF2-40B4-BE49-F238E27FC236}">
+                <a16:creationId xmlns:a16="http://schemas.microsoft.com/office/drawing/2014/main" id="{A9D55B32-38F5-43AA-9FEB-1EC0B65831ED}"/>
+              </a:ext>
+            </a:extLst>
+          </p:cNvPr>
+          <p:cNvSpPr/>
+          <p:nvPr/>
+        </p:nvSpPr>
+        <p:spPr>
+          <a:xfrm rot="16200000">
+            <a:off x="3398121" y="1977250"/>
+            <a:ext cx="184664" cy="280070"/>
+          </a:xfrm>
+          <a:prstGeom prst="downArrow">
+            <a:avLst/>
+          </a:prstGeom>
+          <a:solidFill>
+            <a:srgbClr val="00B0F0"/>
+          </a:solidFill>
+          <a:ln>
+            <a:solidFill>
+              <a:srgbClr val="2F528F"/>
+            </a:solidFill>
+          </a:ln>
+        </p:spPr>
+        <p:style>
+          <a:lnRef idx="2">
+            <a:schemeClr val="accent1">
+              <a:shade val="50000"/>
+            </a:schemeClr>
+          </a:lnRef>
+          <a:fillRef idx="1">
+            <a:schemeClr val="accent1"/>
+          </a:fillRef>
+          <a:effectRef idx="0">
+            <a:schemeClr val="accent1"/>
+          </a:effectRef>
+          <a:fontRef idx="minor">
+            <a:schemeClr val="lt1"/>
+          </a:fontRef>
+        </p:style>
+        <p:txBody>
+          <a:bodyPr rtlCol="0" anchor="ctr"/>
+          <a:lstStyle/>
+          <a:p>
+            <a:pPr algn="ctr"/>
+            <a:endParaRPr lang="pt-PT"/>
+          </a:p>
+        </p:txBody>
+      </p:sp>
+      <p:sp>
+        <p:nvSpPr>
+          <p:cNvPr id="29" name="Seta: Para Baixo 28">
+            <a:extLst>
+              <a:ext uri="{FF2B5EF4-FFF2-40B4-BE49-F238E27FC236}">
+                <a16:creationId xmlns:a16="http://schemas.microsoft.com/office/drawing/2014/main" id="{A8162D08-C6E2-459F-886B-FF38EC7FBC6A}"/>
+              </a:ext>
+            </a:extLst>
+          </p:cNvPr>
+          <p:cNvSpPr/>
+          <p:nvPr/>
+        </p:nvSpPr>
+        <p:spPr>
+          <a:xfrm rot="16200000">
+            <a:off x="3393067" y="3026368"/>
+            <a:ext cx="184664" cy="280070"/>
+          </a:xfrm>
+          <a:prstGeom prst="downArrow">
+            <a:avLst/>
+          </a:prstGeom>
+          <a:solidFill>
+            <a:srgbClr val="00B0F0"/>
+          </a:solidFill>
+          <a:ln>
+            <a:solidFill>
+              <a:srgbClr val="2F528F"/>
+            </a:solidFill>
+          </a:ln>
+        </p:spPr>
+        <p:style>
+          <a:lnRef idx="2">
+            <a:schemeClr val="accent1">
+              <a:shade val="50000"/>
+            </a:schemeClr>
+          </a:lnRef>
+          <a:fillRef idx="1">
+            <a:schemeClr val="accent1"/>
+          </a:fillRef>
+          <a:effectRef idx="0">
+            <a:schemeClr val="accent1"/>
+          </a:effectRef>
+          <a:fontRef idx="minor">
+            <a:schemeClr val="lt1"/>
+          </a:fontRef>
+        </p:style>
+        <p:txBody>
+          <a:bodyPr rtlCol="0" anchor="ctr"/>
+          <a:lstStyle/>
+          <a:p>
+            <a:pPr algn="ctr"/>
+            <a:endParaRPr lang="pt-PT" dirty="0"/>
+          </a:p>
+        </p:txBody>
+      </p:sp>
+      <p:sp>
+        <p:nvSpPr>
+          <p:cNvPr id="30" name="CaixaDeTexto 29">
+            <a:extLst>
+              <a:ext uri="{FF2B5EF4-FFF2-40B4-BE49-F238E27FC236}">
+                <a16:creationId xmlns:a16="http://schemas.microsoft.com/office/drawing/2014/main" id="{678FC65C-0DF5-47A0-A0C4-67C50CC4E7F8}"/>
+              </a:ext>
+            </a:extLst>
+          </p:cNvPr>
+          <p:cNvSpPr txBox="1"/>
+          <p:nvPr/>
+        </p:nvSpPr>
+        <p:spPr>
+          <a:xfrm>
+            <a:off x="3715851" y="2976565"/>
+            <a:ext cx="1635136" cy="369332"/>
+          </a:xfrm>
+          <a:prstGeom prst="rect">
+            <a:avLst/>
+          </a:prstGeom>
+          <a:noFill/>
+        </p:spPr>
+        <p:txBody>
+          <a:bodyPr wrap="square" rtlCol="0">
+            <a:spAutoFit/>
+          </a:bodyPr>
+          <a:lstStyle/>
+          <a:p>
+            <a:r>
+              <a:rPr lang="pt-PT" dirty="0"/>
+              <a:t>Falta conteúdo</a:t>
+            </a:r>
+          </a:p>
+        </p:txBody>
+      </p:sp>
+      <p:sp>
+        <p:nvSpPr>
+          <p:cNvPr id="31" name="Seta: Para Baixo 30">
+            <a:extLst>
+              <a:ext uri="{FF2B5EF4-FFF2-40B4-BE49-F238E27FC236}">
+                <a16:creationId xmlns:a16="http://schemas.microsoft.com/office/drawing/2014/main" id="{CEBCB7D3-5803-4DA0-93CA-C2EBC0EB25B2}"/>
+              </a:ext>
+            </a:extLst>
+          </p:cNvPr>
+          <p:cNvSpPr/>
+          <p:nvPr/>
+        </p:nvSpPr>
+        <p:spPr>
+          <a:xfrm rot="16200000">
+            <a:off x="5429658" y="3026368"/>
+            <a:ext cx="184664" cy="280070"/>
+          </a:xfrm>
+          <a:prstGeom prst="downArrow">
+            <a:avLst/>
+          </a:prstGeom>
+          <a:solidFill>
+            <a:srgbClr val="00B0F0"/>
+          </a:solidFill>
+          <a:ln>
+            <a:solidFill>
+              <a:srgbClr val="2F528F"/>
+            </a:solidFill>
+          </a:ln>
+        </p:spPr>
+        <p:style>
+          <a:lnRef idx="2">
+            <a:schemeClr val="accent1">
+              <a:shade val="50000"/>
+            </a:schemeClr>
+          </a:lnRef>
+          <a:fillRef idx="1">
+            <a:schemeClr val="accent1"/>
+          </a:fillRef>
+          <a:effectRef idx="0">
+            <a:schemeClr val="accent1"/>
+          </a:effectRef>
+          <a:fontRef idx="minor">
+            <a:schemeClr val="lt1"/>
+          </a:fontRef>
+        </p:style>
+        <p:txBody>
+          <a:bodyPr rtlCol="0" anchor="ctr"/>
+          <a:lstStyle/>
+          <a:p>
+            <a:pPr algn="ctr"/>
+            <a:endParaRPr lang="pt-PT"/>
+          </a:p>
+        </p:txBody>
+      </p:sp>
+      <p:sp>
+        <p:nvSpPr>
+          <p:cNvPr id="33" name="CaixaDeTexto 32">
+            <a:extLst>
+              <a:ext uri="{FF2B5EF4-FFF2-40B4-BE49-F238E27FC236}">
+                <a16:creationId xmlns:a16="http://schemas.microsoft.com/office/drawing/2014/main" id="{C3112F72-58A9-4CDF-B3AB-ACF9C9EC4C85}"/>
+              </a:ext>
+            </a:extLst>
+          </p:cNvPr>
+          <p:cNvSpPr txBox="1"/>
+          <p:nvPr/>
+        </p:nvSpPr>
+        <p:spPr>
+          <a:xfrm>
+            <a:off x="5737400" y="2974389"/>
+            <a:ext cx="1035146" cy="369332"/>
+          </a:xfrm>
+          <a:prstGeom prst="rect">
+            <a:avLst/>
+          </a:prstGeom>
+          <a:noFill/>
+        </p:spPr>
+        <p:txBody>
+          <a:bodyPr wrap="square" rtlCol="0">
+            <a:spAutoFit/>
+          </a:bodyPr>
+          <a:lstStyle/>
+          <a:p>
+            <a:r>
+              <a:rPr lang="pt-PT" dirty="0"/>
+              <a:t>Pergunta</a:t>
+            </a:r>
+          </a:p>
+        </p:txBody>
+      </p:sp>
+      <p:sp>
+        <p:nvSpPr>
+          <p:cNvPr id="34" name="Seta: Para Baixo 33">
+            <a:extLst>
+              <a:ext uri="{FF2B5EF4-FFF2-40B4-BE49-F238E27FC236}">
+                <a16:creationId xmlns:a16="http://schemas.microsoft.com/office/drawing/2014/main" id="{2BD071E7-D055-4F67-8525-421D7B6F22B0}"/>
+              </a:ext>
+            </a:extLst>
+          </p:cNvPr>
+          <p:cNvSpPr/>
+          <p:nvPr/>
+        </p:nvSpPr>
+        <p:spPr>
+          <a:xfrm rot="16200000">
+            <a:off x="8543106" y="2479614"/>
+            <a:ext cx="387927" cy="692727"/>
+          </a:xfrm>
+          <a:prstGeom prst="downArrow">
+            <a:avLst/>
+          </a:prstGeom>
+          <a:solidFill>
+            <a:srgbClr val="00B0F0"/>
+          </a:solidFill>
+          <a:ln>
+            <a:solidFill>
+              <a:srgbClr val="2F528F"/>
+            </a:solidFill>
+          </a:ln>
+        </p:spPr>
+        <p:style>
+          <a:lnRef idx="2">
+            <a:schemeClr val="accent1">
+              <a:shade val="50000"/>
+            </a:schemeClr>
+          </a:lnRef>
+          <a:fillRef idx="1">
+            <a:schemeClr val="accent1"/>
+          </a:fillRef>
+          <a:effectRef idx="0">
+            <a:schemeClr val="accent1"/>
+          </a:effectRef>
+          <a:fontRef idx="minor">
+            <a:schemeClr val="lt1"/>
+          </a:fontRef>
+        </p:style>
+        <p:txBody>
+          <a:bodyPr rtlCol="0" anchor="ctr"/>
+          <a:lstStyle/>
+          <a:p>
+            <a:pPr algn="ctr"/>
+            <a:endParaRPr lang="pt-PT"/>
+          </a:p>
+        </p:txBody>
+      </p:sp>
+      <p:sp>
+        <p:nvSpPr>
+          <p:cNvPr id="36" name="Retângulo: Cantos Arredondados 35">
+            <a:extLst>
+              <a:ext uri="{FF2B5EF4-FFF2-40B4-BE49-F238E27FC236}">
+                <a16:creationId xmlns:a16="http://schemas.microsoft.com/office/drawing/2014/main" id="{53EE209C-8F87-437A-9BB9-0F9708966694}"/>
+              </a:ext>
+            </a:extLst>
+          </p:cNvPr>
+          <p:cNvSpPr/>
+          <p:nvPr/>
+        </p:nvSpPr>
+        <p:spPr>
+          <a:xfrm>
+            <a:off x="9399352" y="2554329"/>
+            <a:ext cx="1046019" cy="519742"/>
+          </a:xfrm>
+          <a:prstGeom prst="roundRect">
+            <a:avLst/>
+          </a:prstGeom>
+          <a:solidFill>
+            <a:srgbClr val="EAEAEA"/>
+          </a:solidFill>
+          <a:ln>
+            <a:solidFill>
+              <a:schemeClr val="tx1"/>
+            </a:solidFill>
+          </a:ln>
+        </p:spPr>
+        <p:style>
+          <a:lnRef idx="2">
+            <a:schemeClr val="accent1">
+              <a:shade val="50000"/>
+            </a:schemeClr>
+          </a:lnRef>
+          <a:fillRef idx="1">
+            <a:schemeClr val="accent1"/>
+          </a:fillRef>
+          <a:effectRef idx="0">
+            <a:schemeClr val="accent1"/>
+          </a:effectRef>
+          <a:fontRef idx="minor">
+            <a:schemeClr val="lt1"/>
+          </a:fontRef>
+        </p:style>
+        <p:txBody>
+          <a:bodyPr rtlCol="0" anchor="ctr"/>
+          <a:lstStyle/>
+          <a:p>
+            <a:pPr algn="ctr"/>
+            <a:endParaRPr lang="pt-PT" dirty="0">
+              <a:latin typeface="Arial" panose="020B0604020202020204" pitchFamily="34" charset="0"/>
+              <a:cs typeface="Arial" panose="020B0604020202020204" pitchFamily="34" charset="0"/>
+            </a:endParaRPr>
+          </a:p>
+        </p:txBody>
+      </p:sp>
+      <p:sp>
+        <p:nvSpPr>
+          <p:cNvPr id="38" name="CaixaDeTexto 37">
+            <a:extLst>
+              <a:ext uri="{FF2B5EF4-FFF2-40B4-BE49-F238E27FC236}">
+                <a16:creationId xmlns:a16="http://schemas.microsoft.com/office/drawing/2014/main" id="{25347AAD-DDC7-47B6-8D88-3616CCEDB01E}"/>
+              </a:ext>
+            </a:extLst>
+          </p:cNvPr>
+          <p:cNvSpPr txBox="1"/>
+          <p:nvPr/>
+        </p:nvSpPr>
+        <p:spPr>
+          <a:xfrm>
+            <a:off x="9429224" y="2626910"/>
+            <a:ext cx="1037013" cy="369332"/>
+          </a:xfrm>
+          <a:prstGeom prst="rect">
+            <a:avLst/>
+          </a:prstGeom>
+          <a:noFill/>
+        </p:spPr>
+        <p:txBody>
+          <a:bodyPr wrap="square" rtlCol="0">
+            <a:spAutoFit/>
+          </a:bodyPr>
+          <a:lstStyle/>
+          <a:p>
+            <a:pPr algn="ctr"/>
+            <a:r>
+              <a:rPr lang="pt-PT" dirty="0"/>
+              <a:t>Output</a:t>
+            </a:r>
+          </a:p>
+        </p:txBody>
+      </p:sp>
+      <p:sp>
+        <p:nvSpPr>
+          <p:cNvPr id="39" name="Seta: Para Baixo 38">
+            <a:extLst>
+              <a:ext uri="{FF2B5EF4-FFF2-40B4-BE49-F238E27FC236}">
+                <a16:creationId xmlns:a16="http://schemas.microsoft.com/office/drawing/2014/main" id="{642288B1-A359-4689-86C8-0E66566CE0FC}"/>
+              </a:ext>
+            </a:extLst>
+          </p:cNvPr>
+          <p:cNvSpPr/>
+          <p:nvPr/>
+        </p:nvSpPr>
+        <p:spPr>
+          <a:xfrm rot="16200000">
+            <a:off x="3400188" y="3470722"/>
+            <a:ext cx="184664" cy="280070"/>
+          </a:xfrm>
+          <a:prstGeom prst="downArrow">
+            <a:avLst/>
+          </a:prstGeom>
+          <a:solidFill>
+            <a:srgbClr val="00B0F0"/>
+          </a:solidFill>
+          <a:ln>
+            <a:solidFill>
+              <a:srgbClr val="2F528F"/>
+            </a:solidFill>
+          </a:ln>
+        </p:spPr>
+        <p:style>
+          <a:lnRef idx="2">
+            <a:schemeClr val="accent1">
+              <a:shade val="50000"/>
+            </a:schemeClr>
+          </a:lnRef>
+          <a:fillRef idx="1">
+            <a:schemeClr val="accent1"/>
+          </a:fillRef>
+          <a:effectRef idx="0">
+            <a:schemeClr val="accent1"/>
+          </a:effectRef>
+          <a:fontRef idx="minor">
+            <a:schemeClr val="lt1"/>
+          </a:fontRef>
+        </p:style>
+        <p:txBody>
+          <a:bodyPr rtlCol="0" anchor="ctr"/>
+          <a:lstStyle/>
+          <a:p>
+            <a:pPr algn="ctr"/>
+            <a:endParaRPr lang="pt-PT" dirty="0"/>
+          </a:p>
+        </p:txBody>
+      </p:sp>
+      <p:sp>
+        <p:nvSpPr>
+          <p:cNvPr id="40" name="CaixaDeTexto 39">
+            <a:extLst>
+              <a:ext uri="{FF2B5EF4-FFF2-40B4-BE49-F238E27FC236}">
+                <a16:creationId xmlns:a16="http://schemas.microsoft.com/office/drawing/2014/main" id="{C8B08A71-FC6C-418F-B0B7-37449A1FA7ED}"/>
+              </a:ext>
+            </a:extLst>
+          </p:cNvPr>
+          <p:cNvSpPr txBox="1"/>
+          <p:nvPr/>
+        </p:nvSpPr>
+        <p:spPr>
+          <a:xfrm>
+            <a:off x="3738974" y="3397897"/>
+            <a:ext cx="1411919" cy="369332"/>
+          </a:xfrm>
+          <a:prstGeom prst="rect">
+            <a:avLst/>
+          </a:prstGeom>
+          <a:noFill/>
+        </p:spPr>
+        <p:txBody>
+          <a:bodyPr wrap="square" rtlCol="0">
+            <a:spAutoFit/>
+          </a:bodyPr>
+          <a:lstStyle/>
+          <a:p>
+            <a:r>
+              <a:rPr lang="pt-PT" dirty="0"/>
+              <a:t>Inconclusivo</a:t>
+            </a:r>
+          </a:p>
+        </p:txBody>
+      </p:sp>
+      <p:sp>
+        <p:nvSpPr>
+          <p:cNvPr id="41" name="Seta: Para Baixo 40">
+            <a:extLst>
+              <a:ext uri="{FF2B5EF4-FFF2-40B4-BE49-F238E27FC236}">
+                <a16:creationId xmlns:a16="http://schemas.microsoft.com/office/drawing/2014/main" id="{4E725AF9-5C11-4E36-9650-FAC60ECB3D55}"/>
+              </a:ext>
+            </a:extLst>
+          </p:cNvPr>
+          <p:cNvSpPr/>
+          <p:nvPr/>
+        </p:nvSpPr>
+        <p:spPr>
+          <a:xfrm rot="16200000">
+            <a:off x="5217960" y="3440939"/>
+            <a:ext cx="184664" cy="280070"/>
+          </a:xfrm>
+          <a:prstGeom prst="downArrow">
+            <a:avLst/>
+          </a:prstGeom>
+          <a:solidFill>
+            <a:srgbClr val="00B0F0"/>
+          </a:solidFill>
+          <a:ln>
+            <a:solidFill>
+              <a:srgbClr val="2F528F"/>
+            </a:solidFill>
+          </a:ln>
+        </p:spPr>
+        <p:style>
+          <a:lnRef idx="2">
+            <a:schemeClr val="accent1">
+              <a:shade val="50000"/>
+            </a:schemeClr>
+          </a:lnRef>
+          <a:fillRef idx="1">
+            <a:schemeClr val="accent1"/>
+          </a:fillRef>
+          <a:effectRef idx="0">
+            <a:schemeClr val="accent1"/>
+          </a:effectRef>
+          <a:fontRef idx="minor">
+            <a:schemeClr val="lt1"/>
+          </a:fontRef>
+        </p:style>
+        <p:txBody>
+          <a:bodyPr rtlCol="0" anchor="ctr"/>
+          <a:lstStyle/>
+          <a:p>
+            <a:pPr algn="ctr"/>
+            <a:endParaRPr lang="pt-PT"/>
+          </a:p>
+        </p:txBody>
+      </p:sp>
+      <p:sp>
+        <p:nvSpPr>
+          <p:cNvPr id="42" name="CaixaDeTexto 41">
+            <a:extLst>
+              <a:ext uri="{FF2B5EF4-FFF2-40B4-BE49-F238E27FC236}">
+                <a16:creationId xmlns:a16="http://schemas.microsoft.com/office/drawing/2014/main" id="{12EA8B9A-88A2-484B-8928-60DFF242C479}"/>
+              </a:ext>
+            </a:extLst>
+          </p:cNvPr>
+          <p:cNvSpPr txBox="1"/>
+          <p:nvPr/>
+        </p:nvSpPr>
+        <p:spPr>
+          <a:xfrm>
+            <a:off x="5509157" y="3402065"/>
+            <a:ext cx="2330417" cy="369332"/>
+          </a:xfrm>
+          <a:prstGeom prst="rect">
+            <a:avLst/>
+          </a:prstGeom>
+          <a:noFill/>
+        </p:spPr>
+        <p:txBody>
+          <a:bodyPr wrap="square" rtlCol="0">
+            <a:spAutoFit/>
+          </a:bodyPr>
+          <a:lstStyle/>
+          <a:p>
+            <a:r>
+              <a:rPr lang="pt-PT" dirty="0"/>
+              <a:t>Resposta pré-definida</a:t>
+            </a:r>
+          </a:p>
+        </p:txBody>
+      </p:sp>
+      <p:sp>
+        <p:nvSpPr>
+          <p:cNvPr id="43" name="Seta: Para Baixo 42">
+            <a:extLst>
+              <a:ext uri="{FF2B5EF4-FFF2-40B4-BE49-F238E27FC236}">
+                <a16:creationId xmlns:a16="http://schemas.microsoft.com/office/drawing/2014/main" id="{C410E2F2-D703-4D29-81F6-1FA68D6A74AA}"/>
+              </a:ext>
+            </a:extLst>
+          </p:cNvPr>
+          <p:cNvSpPr/>
+          <p:nvPr/>
+        </p:nvSpPr>
+        <p:spPr>
+          <a:xfrm rot="16200000">
+            <a:off x="6501957" y="1975074"/>
+            <a:ext cx="184664" cy="280070"/>
+          </a:xfrm>
+          <a:prstGeom prst="downArrow">
+            <a:avLst/>
+          </a:prstGeom>
+          <a:solidFill>
+            <a:srgbClr val="00B0F0"/>
+          </a:solidFill>
+          <a:ln>
+            <a:solidFill>
+              <a:srgbClr val="2F528F"/>
+            </a:solidFill>
+          </a:ln>
+        </p:spPr>
+        <p:style>
+          <a:lnRef idx="2">
+            <a:schemeClr val="accent1">
+              <a:shade val="50000"/>
+            </a:schemeClr>
+          </a:lnRef>
+          <a:fillRef idx="1">
+            <a:schemeClr val="accent1"/>
+          </a:fillRef>
+          <a:effectRef idx="0">
+            <a:schemeClr val="accent1"/>
+          </a:effectRef>
+          <a:fontRef idx="minor">
+            <a:schemeClr val="lt1"/>
+          </a:fontRef>
+        </p:style>
+        <p:txBody>
+          <a:bodyPr rtlCol="0" anchor="ctr"/>
+          <a:lstStyle/>
+          <a:p>
+            <a:pPr algn="ctr"/>
+            <a:endParaRPr lang="pt-PT"/>
+          </a:p>
+        </p:txBody>
+      </p:sp>
+      <p:sp>
+        <p:nvSpPr>
+          <p:cNvPr id="44" name="CaixaDeTexto 43">
+            <a:extLst>
+              <a:ext uri="{FF2B5EF4-FFF2-40B4-BE49-F238E27FC236}">
+                <a16:creationId xmlns:a16="http://schemas.microsoft.com/office/drawing/2014/main" id="{78AD4923-96B1-4769-B4ED-192B3B379527}"/>
+              </a:ext>
+            </a:extLst>
+          </p:cNvPr>
+          <p:cNvSpPr txBox="1"/>
+          <p:nvPr/>
+        </p:nvSpPr>
+        <p:spPr>
+          <a:xfrm>
+            <a:off x="6836649" y="1935961"/>
+            <a:ext cx="1035146" cy="369332"/>
+          </a:xfrm>
+          <a:prstGeom prst="rect">
+            <a:avLst/>
+          </a:prstGeom>
+          <a:noFill/>
+        </p:spPr>
+        <p:txBody>
+          <a:bodyPr wrap="square" rtlCol="0">
+            <a:spAutoFit/>
+          </a:bodyPr>
+          <a:lstStyle/>
+          <a:p>
+            <a:pPr algn="ctr"/>
+            <a:r>
+              <a:rPr lang="pt-PT" dirty="0"/>
+              <a:t>Resposta</a:t>
+            </a:r>
+          </a:p>
+        </p:txBody>
+      </p:sp>
+      <p:sp>
+        <p:nvSpPr>
+          <p:cNvPr id="45" name="Seta: Para Baixo 44">
+            <a:extLst>
+              <a:ext uri="{FF2B5EF4-FFF2-40B4-BE49-F238E27FC236}">
+                <a16:creationId xmlns:a16="http://schemas.microsoft.com/office/drawing/2014/main" id="{774719ED-BBDC-4F98-ABB0-FC0B3F19142A}"/>
+              </a:ext>
+            </a:extLst>
+          </p:cNvPr>
+          <p:cNvSpPr/>
+          <p:nvPr/>
+        </p:nvSpPr>
+        <p:spPr>
+          <a:xfrm rot="16200000">
+            <a:off x="3393067" y="2513130"/>
+            <a:ext cx="184664" cy="280070"/>
+          </a:xfrm>
+          <a:prstGeom prst="downArrow">
+            <a:avLst/>
+          </a:prstGeom>
+          <a:solidFill>
+            <a:srgbClr val="00B0F0"/>
+          </a:solidFill>
+          <a:ln>
+            <a:solidFill>
+              <a:srgbClr val="2F528F"/>
+            </a:solidFill>
+          </a:ln>
+        </p:spPr>
+        <p:style>
+          <a:lnRef idx="2">
+            <a:schemeClr val="accent1">
+              <a:shade val="50000"/>
+            </a:schemeClr>
+          </a:lnRef>
+          <a:fillRef idx="1">
+            <a:schemeClr val="accent1"/>
+          </a:fillRef>
+          <a:effectRef idx="0">
+            <a:schemeClr val="accent1"/>
+          </a:effectRef>
+          <a:fontRef idx="minor">
+            <a:schemeClr val="lt1"/>
+          </a:fontRef>
+        </p:style>
+        <p:txBody>
+          <a:bodyPr rtlCol="0" anchor="ctr"/>
+          <a:lstStyle/>
+          <a:p>
+            <a:pPr algn="ctr"/>
+            <a:endParaRPr lang="pt-PT"/>
+          </a:p>
+        </p:txBody>
+      </p:sp>
+      <p:sp>
+        <p:nvSpPr>
+          <p:cNvPr id="46" name="CaixaDeTexto 45">
+            <a:extLst>
+              <a:ext uri="{FF2B5EF4-FFF2-40B4-BE49-F238E27FC236}">
+                <a16:creationId xmlns:a16="http://schemas.microsoft.com/office/drawing/2014/main" id="{09D66BD2-FB2C-449C-9B5C-D027F4E91020}"/>
+              </a:ext>
+            </a:extLst>
+          </p:cNvPr>
+          <p:cNvSpPr txBox="1"/>
+          <p:nvPr/>
+        </p:nvSpPr>
+        <p:spPr>
+          <a:xfrm>
+            <a:off x="3683202" y="2472247"/>
+            <a:ext cx="1035146" cy="369332"/>
+          </a:xfrm>
+          <a:prstGeom prst="rect">
+            <a:avLst/>
+          </a:prstGeom>
+          <a:noFill/>
+        </p:spPr>
+        <p:txBody>
+          <a:bodyPr wrap="square" rtlCol="0">
+            <a:spAutoFit/>
+          </a:bodyPr>
+          <a:lstStyle/>
+          <a:p>
+            <a:pPr algn="ctr"/>
+            <a:r>
+              <a:rPr lang="pt-PT" dirty="0"/>
+              <a:t>Assunto</a:t>
+            </a:r>
+          </a:p>
+        </p:txBody>
+      </p:sp>
+      <p:sp>
+        <p:nvSpPr>
+          <p:cNvPr id="47" name="CaixaDeTexto 46">
+            <a:extLst>
+              <a:ext uri="{FF2B5EF4-FFF2-40B4-BE49-F238E27FC236}">
+                <a16:creationId xmlns:a16="http://schemas.microsoft.com/office/drawing/2014/main" id="{2A4432AC-17A8-4B4A-BB68-0B565343101D}"/>
+              </a:ext>
+            </a:extLst>
+          </p:cNvPr>
+          <p:cNvSpPr txBox="1"/>
+          <p:nvPr/>
+        </p:nvSpPr>
+        <p:spPr>
+          <a:xfrm>
+            <a:off x="5016821" y="2459862"/>
+            <a:ext cx="2212031" cy="369332"/>
+          </a:xfrm>
+          <a:prstGeom prst="rect">
+            <a:avLst/>
+          </a:prstGeom>
+          <a:noFill/>
+        </p:spPr>
+        <p:txBody>
+          <a:bodyPr wrap="square" rtlCol="0">
+            <a:spAutoFit/>
+          </a:bodyPr>
+          <a:lstStyle/>
+          <a:p>
+            <a:pPr algn="ctr"/>
+            <a:r>
+              <a:rPr lang="pt-PT" dirty="0"/>
+              <a:t>Resposta informativa</a:t>
+            </a:r>
+          </a:p>
+        </p:txBody>
+      </p:sp>
+      <p:sp>
+        <p:nvSpPr>
+          <p:cNvPr id="48" name="Seta: Para Baixo 47">
+            <a:extLst>
+              <a:ext uri="{FF2B5EF4-FFF2-40B4-BE49-F238E27FC236}">
+                <a16:creationId xmlns:a16="http://schemas.microsoft.com/office/drawing/2014/main" id="{2B166936-E9BC-4DB5-A127-0AD5A71D560D}"/>
+              </a:ext>
+            </a:extLst>
+          </p:cNvPr>
+          <p:cNvSpPr/>
+          <p:nvPr/>
+        </p:nvSpPr>
+        <p:spPr>
+          <a:xfrm rot="16200000">
+            <a:off x="4795008" y="2507401"/>
+            <a:ext cx="184664" cy="280070"/>
+          </a:xfrm>
+          <a:prstGeom prst="downArrow">
+            <a:avLst/>
+          </a:prstGeom>
+          <a:solidFill>
+            <a:srgbClr val="00B0F0"/>
+          </a:solidFill>
+          <a:ln>
+            <a:solidFill>
+              <a:srgbClr val="2F528F"/>
+            </a:solidFill>
+          </a:ln>
+        </p:spPr>
+        <p:style>
+          <a:lnRef idx="2">
+            <a:schemeClr val="accent1">
+              <a:shade val="50000"/>
+            </a:schemeClr>
+          </a:lnRef>
+          <a:fillRef idx="1">
+            <a:schemeClr val="accent1"/>
+          </a:fillRef>
+          <a:effectRef idx="0">
+            <a:schemeClr val="accent1"/>
+          </a:effectRef>
+          <a:fontRef idx="minor">
+            <a:schemeClr val="lt1"/>
+          </a:fontRef>
+        </p:style>
+        <p:txBody>
+          <a:bodyPr rtlCol="0" anchor="ctr"/>
+          <a:lstStyle/>
+          <a:p>
+            <a:pPr algn="ctr"/>
+            <a:endParaRPr lang="pt-PT"/>
+          </a:p>
+        </p:txBody>
+      </p:sp>
+    </p:spTree>
+    <p:extLst>
+      <p:ext uri="{BB962C8B-B14F-4D97-AF65-F5344CB8AC3E}">
+        <p14:creationId xmlns:p14="http://schemas.microsoft.com/office/powerpoint/2010/main" val="1463252111"/>
+      </p:ext>
+    </p:extLst>
+  </p:cSld>
+  <p:clrMapOvr>
+    <a:masterClrMapping/>
+  </p:clrMapOvr>
+</p:sld>
+</file>
+
 <file path=ppt/theme/theme1.xml><?xml version="1.0" encoding="utf-8"?>
 <a:theme xmlns:a="http://schemas.openxmlformats.org/drawingml/2006/main" name="Tema do Office">
   <a:themeElements>

</xml_diff>